<commit_message>
Reviewd and updated PPT Document, Added My Student ID, Removed few elements given in Template(Meant for guidance), did some size formatting and deleted repetative information
</commit_message>
<xml_diff>
--- a/presentation.pptx
+++ b/presentation.pptx
@@ -160,197 +160,6 @@
     <p1510:client id="{F32A8078-3ADC-47B2-998C-02A067C0899C}" v="26" dt="2025-11-17T20:45:11.957"/>
   </p1510:revLst>
 </p1510:revInfo>
-</file>
-
-<file path=ppt/changesInfos/changesInfo1.xml><?xml version="1.0" encoding="utf-8"?>
-<pc:chgInfo xmlns:a="http://schemas.openxmlformats.org/drawingml/2006/main" xmlns:r="http://schemas.openxmlformats.org/officeDocument/2006/relationships" xmlns:ac="http://schemas.microsoft.com/office/drawing/2013/main/command" xmlns:pc="http://schemas.microsoft.com/office/powerpoint/2013/main/command">
-  <pc:docChgLst>
-    <pc:chgData name="GLADSON DCOSTA" userId="b376d066b8a35b3f" providerId="LiveId" clId="{5E44F80A-A23A-4C0E-9314-EDE890370C0E}"/>
-    <pc:docChg chg="undo custSel addSld modSld">
-      <pc:chgData name="GLADSON DCOSTA" userId="b376d066b8a35b3f" providerId="LiveId" clId="{5E44F80A-A23A-4C0E-9314-EDE890370C0E}" dt="2025-11-18T13:19:06.060" v="338" actId="14100"/>
-      <pc:docMkLst>
-        <pc:docMk/>
-      </pc:docMkLst>
-      <pc:sldChg chg="modSp mod">
-        <pc:chgData name="GLADSON DCOSTA" userId="b376d066b8a35b3f" providerId="LiveId" clId="{5E44F80A-A23A-4C0E-9314-EDE890370C0E}" dt="2025-11-18T13:16:53.144" v="321" actId="5793"/>
-        <pc:sldMkLst>
-          <pc:docMk/>
-          <pc:sldMk cId="4148532546" sldId="289"/>
-        </pc:sldMkLst>
-        <pc:spChg chg="mod">
-          <ac:chgData name="GLADSON DCOSTA" userId="b376d066b8a35b3f" providerId="LiveId" clId="{5E44F80A-A23A-4C0E-9314-EDE890370C0E}" dt="2025-11-18T13:16:53.144" v="321" actId="5793"/>
-          <ac:spMkLst>
-            <pc:docMk/>
-            <pc:sldMk cId="4148532546" sldId="289"/>
-            <ac:spMk id="2" creationId="{3440AEE4-CC66-FE42-B0C3-2CC7AFD37D1C}"/>
-          </ac:spMkLst>
-        </pc:spChg>
-        <pc:spChg chg="mod">
-          <ac:chgData name="GLADSON DCOSTA" userId="b376d066b8a35b3f" providerId="LiveId" clId="{5E44F80A-A23A-4C0E-9314-EDE890370C0E}" dt="2025-11-18T11:45:31.890" v="132" actId="20577"/>
-          <ac:spMkLst>
-            <pc:docMk/>
-            <pc:sldMk cId="4148532546" sldId="289"/>
-            <ac:spMk id="3" creationId="{8275DA97-5166-7F4B-BC83-F50AC8BEDCD7}"/>
-          </ac:spMkLst>
-        </pc:spChg>
-        <pc:spChg chg="mod">
-          <ac:chgData name="GLADSON DCOSTA" userId="b376d066b8a35b3f" providerId="LiveId" clId="{5E44F80A-A23A-4C0E-9314-EDE890370C0E}" dt="2025-11-18T13:16:27.594" v="296" actId="20577"/>
-          <ac:spMkLst>
-            <pc:docMk/>
-            <pc:sldMk cId="4148532546" sldId="289"/>
-            <ac:spMk id="4" creationId="{6E7F4D14-5620-EC41-A86C-6CC3CFD691B4}"/>
-          </ac:spMkLst>
-        </pc:spChg>
-      </pc:sldChg>
-      <pc:sldChg chg="modSp mod">
-        <pc:chgData name="GLADSON DCOSTA" userId="b376d066b8a35b3f" providerId="LiveId" clId="{5E44F80A-A23A-4C0E-9314-EDE890370C0E}" dt="2025-11-18T13:17:24.467" v="323" actId="2711"/>
-        <pc:sldMkLst>
-          <pc:docMk/>
-          <pc:sldMk cId="1718004908" sldId="329"/>
-        </pc:sldMkLst>
-        <pc:spChg chg="mod">
-          <ac:chgData name="GLADSON DCOSTA" userId="b376d066b8a35b3f" providerId="LiveId" clId="{5E44F80A-A23A-4C0E-9314-EDE890370C0E}" dt="2025-11-18T13:17:24.467" v="323" actId="2711"/>
-          <ac:spMkLst>
-            <pc:docMk/>
-            <pc:sldMk cId="1718004908" sldId="329"/>
-            <ac:spMk id="5" creationId="{B3FA3829-F12C-214D-8FBA-7E1A740F65CA}"/>
-          </ac:spMkLst>
-        </pc:spChg>
-      </pc:sldChg>
-      <pc:sldChg chg="delSp modSp mod">
-        <pc:chgData name="GLADSON DCOSTA" userId="b376d066b8a35b3f" providerId="LiveId" clId="{5E44F80A-A23A-4C0E-9314-EDE890370C0E}" dt="2025-11-18T13:17:46.261" v="324" actId="2711"/>
-        <pc:sldMkLst>
-          <pc:docMk/>
-          <pc:sldMk cId="32494612" sldId="336"/>
-        </pc:sldMkLst>
-        <pc:spChg chg="mod">
-          <ac:chgData name="GLADSON DCOSTA" userId="b376d066b8a35b3f" providerId="LiveId" clId="{5E44F80A-A23A-4C0E-9314-EDE890370C0E}" dt="2025-11-18T13:17:46.261" v="324" actId="2711"/>
-          <ac:spMkLst>
-            <pc:docMk/>
-            <pc:sldMk cId="32494612" sldId="336"/>
-            <ac:spMk id="5" creationId="{3440DA25-F620-152B-DE9E-776F7B74DFF0}"/>
-          </ac:spMkLst>
-        </pc:spChg>
-        <pc:spChg chg="del mod">
-          <ac:chgData name="GLADSON DCOSTA" userId="b376d066b8a35b3f" providerId="LiveId" clId="{5E44F80A-A23A-4C0E-9314-EDE890370C0E}" dt="2025-11-18T00:07:30.763" v="61" actId="478"/>
-          <ac:spMkLst>
-            <pc:docMk/>
-            <pc:sldMk cId="32494612" sldId="336"/>
-            <ac:spMk id="7" creationId="{F7FEA660-7B39-BC91-3B96-7298CCF66DE1}"/>
-          </ac:spMkLst>
-        </pc:spChg>
-      </pc:sldChg>
-      <pc:sldChg chg="modSp mod">
-        <pc:chgData name="GLADSON DCOSTA" userId="b376d066b8a35b3f" providerId="LiveId" clId="{5E44F80A-A23A-4C0E-9314-EDE890370C0E}" dt="2025-11-18T11:47:18.725" v="159" actId="255"/>
-        <pc:sldMkLst>
-          <pc:docMk/>
-          <pc:sldMk cId="713092616" sldId="340"/>
-        </pc:sldMkLst>
-        <pc:spChg chg="mod">
-          <ac:chgData name="GLADSON DCOSTA" userId="b376d066b8a35b3f" providerId="LiveId" clId="{5E44F80A-A23A-4C0E-9314-EDE890370C0E}" dt="2025-11-18T11:47:18.725" v="159" actId="255"/>
-          <ac:spMkLst>
-            <pc:docMk/>
-            <pc:sldMk cId="713092616" sldId="340"/>
-            <ac:spMk id="8" creationId="{6E140EA5-BB03-811F-4631-603A97631914}"/>
-          </ac:spMkLst>
-        </pc:spChg>
-        <pc:picChg chg="mod modCrop">
-          <ac:chgData name="GLADSON DCOSTA" userId="b376d066b8a35b3f" providerId="LiveId" clId="{5E44F80A-A23A-4C0E-9314-EDE890370C0E}" dt="2025-11-18T00:03:49.476" v="15" actId="1076"/>
-          <ac:picMkLst>
-            <pc:docMk/>
-            <pc:sldMk cId="713092616" sldId="340"/>
-            <ac:picMk id="10" creationId="{3FFA34DC-1405-C5C0-A5DD-2E71D3A34C81}"/>
-          </ac:picMkLst>
-        </pc:picChg>
-      </pc:sldChg>
-      <pc:sldChg chg="modSp mod">
-        <pc:chgData name="GLADSON DCOSTA" userId="b376d066b8a35b3f" providerId="LiveId" clId="{5E44F80A-A23A-4C0E-9314-EDE890370C0E}" dt="2025-11-18T13:17:53.032" v="325" actId="2711"/>
-        <pc:sldMkLst>
-          <pc:docMk/>
-          <pc:sldMk cId="2952338475" sldId="341"/>
-        </pc:sldMkLst>
-        <pc:spChg chg="mod">
-          <ac:chgData name="GLADSON DCOSTA" userId="b376d066b8a35b3f" providerId="LiveId" clId="{5E44F80A-A23A-4C0E-9314-EDE890370C0E}" dt="2025-11-18T13:17:53.032" v="325" actId="2711"/>
-          <ac:spMkLst>
-            <pc:docMk/>
-            <pc:sldMk cId="2952338475" sldId="341"/>
-            <ac:spMk id="2" creationId="{6B64221B-D6D4-E382-A91A-99FF908D5475}"/>
-          </ac:spMkLst>
-        </pc:spChg>
-      </pc:sldChg>
-      <pc:sldChg chg="addSp modSp mod">
-        <pc:chgData name="GLADSON DCOSTA" userId="b376d066b8a35b3f" providerId="LiveId" clId="{5E44F80A-A23A-4C0E-9314-EDE890370C0E}" dt="2025-11-18T13:19:06.060" v="338" actId="14100"/>
-        <pc:sldMkLst>
-          <pc:docMk/>
-          <pc:sldMk cId="2592644112" sldId="342"/>
-        </pc:sldMkLst>
-        <pc:spChg chg="add mod">
-          <ac:chgData name="GLADSON DCOSTA" userId="b376d066b8a35b3f" providerId="LiveId" clId="{5E44F80A-A23A-4C0E-9314-EDE890370C0E}" dt="2025-11-18T13:19:06.060" v="338" actId="14100"/>
-          <ac:spMkLst>
-            <pc:docMk/>
-            <pc:sldMk cId="2592644112" sldId="342"/>
-            <ac:spMk id="2" creationId="{DB436ED9-9785-45C7-A031-0BCCAF2AB584}"/>
-          </ac:spMkLst>
-        </pc:spChg>
-        <pc:spChg chg="mod">
-          <ac:chgData name="GLADSON DCOSTA" userId="b376d066b8a35b3f" providerId="LiveId" clId="{5E44F80A-A23A-4C0E-9314-EDE890370C0E}" dt="2025-11-18T13:18:30.621" v="332" actId="21"/>
-          <ac:spMkLst>
-            <pc:docMk/>
-            <pc:sldMk cId="2592644112" sldId="342"/>
-            <ac:spMk id="5" creationId="{5F915859-CEB0-1BCD-04EA-B6E8E7EB90AA}"/>
-          </ac:spMkLst>
-        </pc:spChg>
-      </pc:sldChg>
-      <pc:sldChg chg="addSp delSp modSp new mod">
-        <pc:chgData name="GLADSON DCOSTA" userId="b376d066b8a35b3f" providerId="LiveId" clId="{5E44F80A-A23A-4C0E-9314-EDE890370C0E}" dt="2025-11-18T00:13:50.475" v="118" actId="20577"/>
-        <pc:sldMkLst>
-          <pc:docMk/>
-          <pc:sldMk cId="3314040529" sldId="343"/>
-        </pc:sldMkLst>
-        <pc:spChg chg="del mod">
-          <ac:chgData name="GLADSON DCOSTA" userId="b376d066b8a35b3f" providerId="LiveId" clId="{5E44F80A-A23A-4C0E-9314-EDE890370C0E}" dt="2025-11-18T00:12:22.854" v="101" actId="21"/>
-          <ac:spMkLst>
-            <pc:docMk/>
-            <pc:sldMk cId="3314040529" sldId="343"/>
-            <ac:spMk id="2" creationId="{2F5DADAC-3808-AAD0-1C40-8C14734031AB}"/>
-          </ac:spMkLst>
-        </pc:spChg>
-        <pc:spChg chg="del mod">
-          <ac:chgData name="GLADSON DCOSTA" userId="b376d066b8a35b3f" providerId="LiveId" clId="{5E44F80A-A23A-4C0E-9314-EDE890370C0E}" dt="2025-11-18T00:11:21.433" v="76" actId="21"/>
-          <ac:spMkLst>
-            <pc:docMk/>
-            <pc:sldMk cId="3314040529" sldId="343"/>
-            <ac:spMk id="5" creationId="{9012332B-2873-34B1-3503-C135D4FBAD35}"/>
-          </ac:spMkLst>
-        </pc:spChg>
-        <pc:spChg chg="add del mod">
-          <ac:chgData name="GLADSON DCOSTA" userId="b376d066b8a35b3f" providerId="LiveId" clId="{5E44F80A-A23A-4C0E-9314-EDE890370C0E}" dt="2025-11-18T00:13:04.925" v="111" actId="478"/>
-          <ac:spMkLst>
-            <pc:docMk/>
-            <pc:sldMk cId="3314040529" sldId="343"/>
-            <ac:spMk id="6" creationId="{9E7E294F-0CC9-E8D3-6623-B214AEEFDA47}"/>
-          </ac:spMkLst>
-        </pc:spChg>
-        <pc:spChg chg="add del mod">
-          <ac:chgData name="GLADSON DCOSTA" userId="b376d066b8a35b3f" providerId="LiveId" clId="{5E44F80A-A23A-4C0E-9314-EDE890370C0E}" dt="2025-11-18T00:13:04.928" v="113"/>
-          <ac:spMkLst>
-            <pc:docMk/>
-            <pc:sldMk cId="3314040529" sldId="343"/>
-            <ac:spMk id="7" creationId="{710E02E1-8832-64E7-74D4-05A35D409883}"/>
-          </ac:spMkLst>
-        </pc:spChg>
-        <pc:spChg chg="add mod">
-          <ac:chgData name="GLADSON DCOSTA" userId="b376d066b8a35b3f" providerId="LiveId" clId="{5E44F80A-A23A-4C0E-9314-EDE890370C0E}" dt="2025-11-18T00:13:50.475" v="118" actId="20577"/>
-          <ac:spMkLst>
-            <pc:docMk/>
-            <pc:sldMk cId="3314040529" sldId="343"/>
-            <ac:spMk id="9" creationId="{6D670FE0-2AA4-66DA-F27C-C77E4E379B4D}"/>
-          </ac:spMkLst>
-        </pc:spChg>
-      </pc:sldChg>
-    </pc:docChg>
-  </pc:docChgLst>
-</pc:chgInfo>
 </file>
 
 <file path=ppt/handoutMasters/handoutMaster1.xml><?xml version="1.0" encoding="utf-8"?>
@@ -5186,19 +4995,16 @@
               <a:rPr lang="en-GB" dirty="0"/>
               <a:t>							                Sangam Balakrishna - 23113892									                Nithish - </a:t>
             </a:r>
+            <a:r>
+              <a:rPr lang="en-IN" dirty="0"/>
+              <a:t>23105965</a:t>
+            </a:r>
+            <a:endParaRPr lang="en-GB" dirty="0"/>
           </a:p>
           <a:p>
             <a:r>
               <a:rPr lang="en-GB" dirty="0"/>
-              <a:t>							                Pranay </a:t>
-            </a:r>
-            <a:r>
-              <a:rPr lang="en-GB" dirty="0" err="1"/>
-              <a:t>nani</a:t>
-            </a:r>
-            <a:r>
-              <a:rPr lang="en-GB" dirty="0"/>
-              <a:t> - </a:t>
+              <a:t>							                Pranay Nani - </a:t>
             </a:r>
           </a:p>
           <a:p>
@@ -5306,7 +5112,12 @@
             <p:ph type="ftr" sz="quarter" idx="11"/>
           </p:nvPr>
         </p:nvSpPr>
-        <p:spPr/>
+        <p:spPr>
+          <a:xfrm>
+            <a:off x="859179" y="560190"/>
+            <a:ext cx="7176911" cy="230832"/>
+          </a:xfrm>
+        </p:spPr>
         <p:txBody>
           <a:bodyPr/>
           <a:lstStyle/>
@@ -5393,7 +5204,7 @@
               <a:buAutoNum type="arabicPeriod"/>
             </a:pPr>
             <a:r>
-              <a:rPr lang="en-GB" sz="2000" dirty="0">
+              <a:rPr lang="en-GB" sz="2200" dirty="0">
                 <a:solidFill>
                   <a:srgbClr val="FF0000"/>
                 </a:solidFill>
@@ -5412,13 +5223,13 @@
               </a:rPr>
             </a:br>
             <a:r>
-              <a:rPr lang="en-GB" sz="2200" b="0" dirty="0">
+              <a:rPr lang="en-GB" sz="2000" b="0" dirty="0">
                 <a:latin typeface="Times New Roman" panose="02020603050405020304" pitchFamily="18" charset="0"/>
                 <a:cs typeface="Times New Roman" panose="02020603050405020304" pitchFamily="18" charset="0"/>
               </a:rPr>
               <a:t>Happiness Score and Economy (GDP per Capita)</a:t>
             </a:r>
-            <a:endParaRPr lang="en-US" sz="2200" b="0" dirty="0">
+            <a:endParaRPr lang="en-US" sz="2000" b="0" dirty="0">
               <a:latin typeface="Times New Roman" panose="02020603050405020304" pitchFamily="18" charset="0"/>
               <a:cs typeface="Times New Roman" panose="02020603050405020304" pitchFamily="18" charset="0"/>
             </a:endParaRPr>
@@ -5523,7 +5334,7 @@
               </a:rPr>
             </a:br>
             <a:r>
-              <a:rPr lang="en-GB" sz="2200" b="0" dirty="0">
+              <a:rPr lang="en-GB" sz="2000" b="0" dirty="0">
                 <a:latin typeface="Times New Roman" panose="02020603050405020304" pitchFamily="18" charset="0"/>
                 <a:cs typeface="Times New Roman" panose="02020603050405020304" pitchFamily="18" charset="0"/>
               </a:rPr>
@@ -5781,8 +5592,8 @@
         </p:nvSpPr>
         <p:spPr>
           <a:xfrm>
-            <a:off x="965288" y="1285092"/>
-            <a:ext cx="10110240" cy="588024"/>
+            <a:off x="965288" y="1163357"/>
+            <a:ext cx="10110240" cy="352567"/>
           </a:xfrm>
         </p:spPr>
         <p:txBody>
@@ -5792,11 +5603,11 @@
           <a:lstStyle/>
           <a:p>
             <a:r>
-              <a:rPr lang="en-US" dirty="0"/>
+              <a:rPr lang="en-US" sz="2400" dirty="0"/>
               <a:t>Dataset </a:t>
             </a:r>
             <a:r>
-              <a:rPr lang="en-US" dirty="0">
+              <a:rPr lang="en-US" sz="2400" dirty="0">
                 <a:solidFill>
                   <a:srgbClr val="203232"/>
                 </a:solidFill>
@@ -5804,12 +5615,20 @@
               <a:t>ID</a:t>
             </a:r>
             <a:r>
+              <a:rPr lang="en-US" sz="2400" dirty="0">
+                <a:solidFill>
+                  <a:srgbClr val="FF0000"/>
+                </a:solidFill>
+              </a:rPr>
+              <a:t>: </a:t>
+            </a:r>
+            <a:r>
               <a:rPr lang="en-US" sz="1600" dirty="0">
                 <a:solidFill>
                   <a:srgbClr val="FF0000"/>
                 </a:solidFill>
               </a:rPr>
-              <a:t>:   </a:t>
+              <a:t>  </a:t>
             </a:r>
             <a:r>
               <a:rPr lang="en-US" sz="2400" dirty="0">
@@ -5907,8 +5726,8 @@
         </p:nvSpPr>
         <p:spPr>
           <a:xfrm>
-            <a:off x="965288" y="1698305"/>
-            <a:ext cx="10974945" cy="2699181"/>
+            <a:off x="965288" y="1657427"/>
+            <a:ext cx="10974945" cy="2462909"/>
           </a:xfrm>
         </p:spPr>
         <p:txBody>
@@ -5923,7 +5742,7 @@
               </a:lnSpc>
             </a:pPr>
             <a:r>
-              <a:rPr lang="en-US" sz="2400" dirty="0">
+              <a:rPr lang="en-US" sz="2000" dirty="0">
                 <a:latin typeface="Times New Roman" panose="02020603050405020304" pitchFamily="18" charset="0"/>
                 <a:cs typeface="Times New Roman" panose="02020603050405020304" pitchFamily="18" charset="0"/>
               </a:rPr>
@@ -5947,11 +5766,18 @@
               <a:t> </a:t>
             </a:r>
             <a:r>
+              <a:rPr lang="en-GB" sz="1800" b="0" dirty="0">
+                <a:latin typeface="Times New Roman" panose="02020603050405020304" pitchFamily="18" charset="0"/>
+                <a:cs typeface="Times New Roman" panose="02020603050405020304" pitchFamily="18" charset="0"/>
+              </a:rPr>
+              <a:t>This dataset is interesting to us because it allows us to compare how economic conditions relate to people’s overall happiness across different countries</a:t>
+            </a:r>
+            <a:r>
               <a:rPr lang="en-GB" sz="2400" b="0" dirty="0">
                 <a:latin typeface="Times New Roman" panose="02020603050405020304" pitchFamily="18" charset="0"/>
                 <a:cs typeface="Times New Roman" panose="02020603050405020304" pitchFamily="18" charset="0"/>
               </a:rPr>
-              <a:t>This dataset is interesting to us because it allows us to compare how economic conditions relate to people’s overall happiness across different countries.</a:t>
+              <a:t>.</a:t>
             </a:r>
             <a:br>
               <a:rPr lang="en-GB" sz="2400" b="0" dirty="0">
@@ -5966,18 +5792,119 @@
               </a:rPr>
             </a:br>
             <a:r>
+              <a:rPr lang="en-US" sz="2000" dirty="0">
+                <a:latin typeface="Times New Roman" panose="02020603050405020304" pitchFamily="18" charset="0"/>
+                <a:cs typeface="Times New Roman" panose="02020603050405020304" pitchFamily="18" charset="0"/>
+              </a:rPr>
+              <a:t>Our  Independent variable is</a:t>
+            </a:r>
+            <a:r>
               <a:rPr lang="en-US" sz="2400" dirty="0">
                 <a:latin typeface="Times New Roman" panose="02020603050405020304" pitchFamily="18" charset="0"/>
                 <a:cs typeface="Times New Roman" panose="02020603050405020304" pitchFamily="18" charset="0"/>
               </a:rPr>
-              <a:t>Our  Independent variable is: </a:t>
-            </a:r>
-            <a:r>
-              <a:rPr lang="en-IN" sz="2400" b="0" dirty="0">
+              <a:t>: </a:t>
+            </a:r>
+            <a:r>
+              <a:rPr lang="en-IN" sz="1800" b="0" dirty="0">
                 <a:latin typeface="Times New Roman" panose="02020603050405020304" pitchFamily="18" charset="0"/>
                 <a:cs typeface="Times New Roman" panose="02020603050405020304" pitchFamily="18" charset="0"/>
               </a:rPr>
               <a:t>Economy (GDP per Capita)</a:t>
+            </a:r>
+            <a:br>
+              <a:rPr lang="en-US" sz="1800" b="0" dirty="0">
+                <a:latin typeface="Times New Roman" panose="02020603050405020304" pitchFamily="18" charset="0"/>
+                <a:cs typeface="Times New Roman" panose="02020603050405020304" pitchFamily="18" charset="0"/>
+              </a:rPr>
+            </a:br>
+            <a:r>
+              <a:rPr lang="en-US" sz="2000" dirty="0">
+                <a:latin typeface="Times New Roman" panose="02020603050405020304" pitchFamily="18" charset="0"/>
+                <a:cs typeface="Times New Roman" panose="02020603050405020304" pitchFamily="18" charset="0"/>
+              </a:rPr>
+              <a:t>This  Independent variable datatype is </a:t>
+            </a:r>
+            <a:r>
+              <a:rPr lang="en-US" sz="2400" dirty="0">
+                <a:latin typeface="Times New Roman" panose="02020603050405020304" pitchFamily="18" charset="0"/>
+                <a:cs typeface="Times New Roman" panose="02020603050405020304" pitchFamily="18" charset="0"/>
+              </a:rPr>
+              <a:t>: </a:t>
+            </a:r>
+            <a:r>
+              <a:rPr lang="en-GB" sz="1800" b="0" dirty="0">
+                <a:latin typeface="Times New Roman" panose="02020603050405020304" pitchFamily="18" charset="0"/>
+                <a:cs typeface="Times New Roman" panose="02020603050405020304" pitchFamily="18" charset="0"/>
+              </a:rPr>
+              <a:t>Interval/measurement data</a:t>
+            </a:r>
+            <a:br>
+              <a:rPr lang="en-GB" sz="2400" b="0" dirty="0">
+                <a:latin typeface="Times New Roman" panose="02020603050405020304" pitchFamily="18" charset="0"/>
+                <a:cs typeface="Times New Roman" panose="02020603050405020304" pitchFamily="18" charset="0"/>
+              </a:rPr>
+            </a:br>
+            <a:r>
+              <a:rPr lang="en-GB" sz="2000" b="0" dirty="0">
+                <a:latin typeface="Times New Roman" panose="02020603050405020304" pitchFamily="18" charset="0"/>
+                <a:cs typeface="Times New Roman" panose="02020603050405020304" pitchFamily="18" charset="0"/>
+              </a:rPr>
+              <a:t>(</a:t>
+            </a:r>
+            <a:r>
+              <a:rPr lang="en-GB" sz="2000" dirty="0">
+                <a:latin typeface="Times New Roman" panose="02020603050405020304" pitchFamily="18" charset="0"/>
+                <a:cs typeface="Times New Roman" panose="02020603050405020304" pitchFamily="18" charset="0"/>
+              </a:rPr>
+              <a:t>Reason:</a:t>
+            </a:r>
+            <a:r>
+              <a:rPr lang="en-GB" sz="2400" dirty="0">
+                <a:latin typeface="Times New Roman" panose="02020603050405020304" pitchFamily="18" charset="0"/>
+                <a:cs typeface="Times New Roman" panose="02020603050405020304" pitchFamily="18" charset="0"/>
+              </a:rPr>
+              <a:t> </a:t>
+            </a:r>
+            <a:r>
+              <a:rPr lang="en-GB" sz="1800" b="0" dirty="0">
+                <a:latin typeface="Times New Roman" panose="02020603050405020304" pitchFamily="18" charset="0"/>
+                <a:cs typeface="Times New Roman" panose="02020603050405020304" pitchFamily="18" charset="0"/>
+              </a:rPr>
+              <a:t>It is a numerical, continuous variable measured on a meaningful scale.</a:t>
+            </a:r>
+            <a:r>
+              <a:rPr lang="en-GB" sz="2000" b="0" dirty="0">
+                <a:latin typeface="Times New Roman" panose="02020603050405020304" pitchFamily="18" charset="0"/>
+                <a:cs typeface="Times New Roman" panose="02020603050405020304" pitchFamily="18" charset="0"/>
+              </a:rPr>
+              <a:t>)</a:t>
+            </a:r>
+            <a:br>
+              <a:rPr lang="en-GB" sz="2000" b="0" dirty="0">
+                <a:latin typeface="Times New Roman" panose="02020603050405020304" pitchFamily="18" charset="0"/>
+                <a:cs typeface="Times New Roman" panose="02020603050405020304" pitchFamily="18" charset="0"/>
+              </a:rPr>
+            </a:br>
+            <a:br>
+              <a:rPr lang="en-GB" sz="2400" b="0" dirty="0">
+                <a:latin typeface="Times New Roman" panose="02020603050405020304" pitchFamily="18" charset="0"/>
+                <a:cs typeface="Times New Roman" panose="02020603050405020304" pitchFamily="18" charset="0"/>
+              </a:rPr>
+            </a:br>
+            <a:r>
+              <a:rPr lang="en-US" sz="2000" dirty="0">
+                <a:latin typeface="Times New Roman" panose="02020603050405020304" pitchFamily="18" charset="0"/>
+                <a:cs typeface="Times New Roman" panose="02020603050405020304" pitchFamily="18" charset="0"/>
+              </a:rPr>
+              <a:t>Our Dependent variable is: </a:t>
+            </a:r>
+            <a:r>
+              <a:rPr lang="en-IN" sz="1800" b="0" dirty="0">
+                <a:latin typeface="Times New Roman" panose="02020603050405020304" pitchFamily="18" charset="0"/>
+                <a:cs typeface="Times New Roman" panose="02020603050405020304" pitchFamily="18" charset="0"/>
+              </a:rPr>
+              <a:t>Happiness Score</a:t>
             </a:r>
             <a:br>
               <a:rPr lang="en-US" sz="2400" b="0" dirty="0">
@@ -5986,7 +5913,7 @@
               </a:rPr>
             </a:br>
             <a:r>
-              <a:rPr lang="en-US" sz="2400" b="0" dirty="0">
+              <a:rPr lang="en-US" sz="2400" dirty="0">
                 <a:solidFill>
                   <a:srgbClr val="FF0000"/>
                 </a:solidFill>
@@ -5996,104 +5923,21 @@
               <a:t> </a:t>
             </a:r>
             <a:r>
-              <a:rPr lang="en-US" sz="2400" dirty="0">
+              <a:rPr lang="en-US" sz="2000" dirty="0">
                 <a:latin typeface="Times New Roman" panose="02020603050405020304" pitchFamily="18" charset="0"/>
                 <a:cs typeface="Times New Roman" panose="02020603050405020304" pitchFamily="18" charset="0"/>
               </a:rPr>
-              <a:t>This  Independent variable datatype is : </a:t>
-            </a:r>
-            <a:r>
-              <a:rPr lang="en-GB" sz="2400" b="0" dirty="0">
-                <a:latin typeface="Times New Roman" panose="02020603050405020304" pitchFamily="18" charset="0"/>
-                <a:cs typeface="Times New Roman" panose="02020603050405020304" pitchFamily="18" charset="0"/>
-              </a:rPr>
-              <a:t>Interval/measurement data</a:t>
-            </a:r>
-            <a:br>
-              <a:rPr lang="en-GB" sz="2400" b="0" dirty="0">
-                <a:latin typeface="Times New Roman" panose="02020603050405020304" pitchFamily="18" charset="0"/>
-                <a:cs typeface="Times New Roman" panose="02020603050405020304" pitchFamily="18" charset="0"/>
-              </a:rPr>
-            </a:br>
-            <a:r>
-              <a:rPr lang="en-GB" sz="2400" b="0" dirty="0">
-                <a:latin typeface="Times New Roman" panose="02020603050405020304" pitchFamily="18" charset="0"/>
-                <a:cs typeface="Times New Roman" panose="02020603050405020304" pitchFamily="18" charset="0"/>
-              </a:rPr>
-              <a:t>(</a:t>
-            </a:r>
-            <a:r>
-              <a:rPr lang="en-GB" sz="2400" dirty="0">
-                <a:latin typeface="Times New Roman" panose="02020603050405020304" pitchFamily="18" charset="0"/>
-                <a:cs typeface="Times New Roman" panose="02020603050405020304" pitchFamily="18" charset="0"/>
-              </a:rPr>
-              <a:t>Reason: </a:t>
-            </a:r>
-            <a:r>
-              <a:rPr lang="en-GB" sz="2400" b="0" dirty="0">
-                <a:latin typeface="Times New Roman" panose="02020603050405020304" pitchFamily="18" charset="0"/>
-                <a:cs typeface="Times New Roman" panose="02020603050405020304" pitchFamily="18" charset="0"/>
-              </a:rPr>
-              <a:t>It is a numerical, continuous variable measured on a meaningful scale.)</a:t>
-            </a:r>
-            <a:br>
-              <a:rPr lang="en-GB" sz="2400" b="0" dirty="0">
-                <a:latin typeface="Times New Roman" panose="02020603050405020304" pitchFamily="18" charset="0"/>
-                <a:cs typeface="Times New Roman" panose="02020603050405020304" pitchFamily="18" charset="0"/>
-              </a:rPr>
-            </a:br>
-            <a:br>
+              <a:t>This Dependent variable datatype is  </a:t>
+            </a:r>
+            <a:r>
               <a:rPr lang="en-US" sz="2400" b="0" dirty="0">
                 <a:latin typeface="Times New Roman" panose="02020603050405020304" pitchFamily="18" charset="0"/>
                 <a:cs typeface="Times New Roman" panose="02020603050405020304" pitchFamily="18" charset="0"/>
               </a:rPr>
-            </a:br>
-            <a:r>
-              <a:rPr lang="en-US" sz="2400" dirty="0">
-                <a:latin typeface="Times New Roman" panose="02020603050405020304" pitchFamily="18" charset="0"/>
-                <a:cs typeface="Times New Roman" panose="02020603050405020304" pitchFamily="18" charset="0"/>
-              </a:rPr>
-              <a:t>Our Dependent variable is: </a:t>
-            </a:r>
-            <a:r>
-              <a:rPr lang="en-IN" sz="2400" b="0" dirty="0">
-                <a:latin typeface="Times New Roman" panose="02020603050405020304" pitchFamily="18" charset="0"/>
-                <a:cs typeface="Times New Roman" panose="02020603050405020304" pitchFamily="18" charset="0"/>
-              </a:rPr>
-              <a:t>Happiness Score</a:t>
-            </a:r>
-            <a:br>
-              <a:rPr lang="en-US" sz="2400" b="0" dirty="0">
-                <a:latin typeface="Times New Roman" panose="02020603050405020304" pitchFamily="18" charset="0"/>
-                <a:cs typeface="Times New Roman" panose="02020603050405020304" pitchFamily="18" charset="0"/>
-              </a:rPr>
-            </a:br>
-            <a:r>
-              <a:rPr lang="en-US" sz="2400" dirty="0">
-                <a:solidFill>
-                  <a:srgbClr val="FF0000"/>
-                </a:solidFill>
-                <a:latin typeface="Times New Roman" panose="02020603050405020304" pitchFamily="18" charset="0"/>
-                <a:cs typeface="Times New Roman" panose="02020603050405020304" pitchFamily="18" charset="0"/>
-              </a:rPr>
-              <a:t> </a:t>
-            </a:r>
-            <a:r>
-              <a:rPr lang="en-US" sz="2400" dirty="0">
-                <a:latin typeface="Times New Roman" panose="02020603050405020304" pitchFamily="18" charset="0"/>
-                <a:cs typeface="Times New Roman" panose="02020603050405020304" pitchFamily="18" charset="0"/>
-              </a:rPr>
-              <a:t>This Dependent variable datatype is  </a:t>
-            </a:r>
-            <a:r>
-              <a:rPr lang="en-US" sz="2400" b="0" dirty="0">
-                <a:latin typeface="Times New Roman" panose="02020603050405020304" pitchFamily="18" charset="0"/>
-                <a:cs typeface="Times New Roman" panose="02020603050405020304" pitchFamily="18" charset="0"/>
-              </a:rPr>
               <a:t>: </a:t>
             </a:r>
             <a:r>
-              <a:rPr lang="en-GB" sz="2400" b="0" dirty="0">
+              <a:rPr lang="en-GB" sz="1800" b="0" dirty="0">
                 <a:latin typeface="Times New Roman" panose="02020603050405020304" pitchFamily="18" charset="0"/>
                 <a:cs typeface="Times New Roman" panose="02020603050405020304" pitchFamily="18" charset="0"/>
               </a:rPr>
@@ -6113,18 +5957,32 @@
               <a:t>(</a:t>
             </a:r>
             <a:r>
+              <a:rPr lang="en-GB" sz="2000" dirty="0">
+                <a:latin typeface="Times New Roman" panose="02020603050405020304" pitchFamily="18" charset="0"/>
+                <a:cs typeface="Times New Roman" panose="02020603050405020304" pitchFamily="18" charset="0"/>
+              </a:rPr>
+              <a:t>Reason:</a:t>
+            </a:r>
+            <a:r>
               <a:rPr lang="en-GB" sz="2400" dirty="0">
                 <a:latin typeface="Times New Roman" panose="02020603050405020304" pitchFamily="18" charset="0"/>
                 <a:cs typeface="Times New Roman" panose="02020603050405020304" pitchFamily="18" charset="0"/>
               </a:rPr>
-              <a:t>Reason: </a:t>
+              <a:t> </a:t>
+            </a:r>
+            <a:r>
+              <a:rPr lang="en-GB" sz="1800" b="0" dirty="0">
+                <a:latin typeface="Times New Roman" panose="02020603050405020304" pitchFamily="18" charset="0"/>
+                <a:cs typeface="Times New Roman" panose="02020603050405020304" pitchFamily="18" charset="0"/>
+              </a:rPr>
+              <a:t>Happiness Score is a numerical, continuous value</a:t>
             </a:r>
             <a:r>
               <a:rPr lang="en-GB" sz="2400" b="0" dirty="0">
                 <a:latin typeface="Times New Roman" panose="02020603050405020304" pitchFamily="18" charset="0"/>
                 <a:cs typeface="Times New Roman" panose="02020603050405020304" pitchFamily="18" charset="0"/>
               </a:rPr>
-              <a:t>Happiness Score is a numerical, continuous value.)</a:t>
+              <a:t>.)</a:t>
             </a:r>
             <a:endParaRPr lang="en-US" sz="2400" b="0" dirty="0">
               <a:solidFill>
@@ -6184,24 +6042,24 @@
         </p:nvSpPr>
         <p:spPr>
           <a:xfrm>
-            <a:off x="965289" y="1147638"/>
-            <a:ext cx="9753625" cy="230832"/>
+            <a:off x="965289" y="1589930"/>
+            <a:ext cx="9753625" cy="465012"/>
           </a:xfrm>
         </p:spPr>
         <p:txBody>
           <a:bodyPr/>
           <a:lstStyle/>
           <a:p>
-            <a:pPr>
+            <a:pPr algn="ctr">
               <a:spcAft>
                 <a:spcPts val="0"/>
               </a:spcAft>
             </a:pPr>
             <a:r>
-              <a:rPr lang="en-GB" dirty="0"/>
+              <a:rPr lang="en-GB" sz="2400" dirty="0"/>
               <a:t>Our Research Question is</a:t>
             </a:r>
-            <a:endParaRPr lang="en-GB" sz="1800" dirty="0">
+            <a:endParaRPr lang="en-GB" sz="2400" dirty="0">
               <a:solidFill>
                 <a:srgbClr val="FF0000"/>
               </a:solidFill>
@@ -6231,8 +6089,8 @@
           <a:lstStyle/>
           <a:p>
             <a:r>
-              <a:rPr lang="en-GB"/>
-              <a:t>PRE 7COM1079-2025  Student Group No:  ?????</a:t>
+              <a:rPr lang="en-GB" dirty="0"/>
+              <a:t>PRE 7COM1079-2025  Student Group No: B111</a:t>
             </a:r>
           </a:p>
         </p:txBody>
@@ -6289,8 +6147,8 @@
         </p:nvSpPr>
         <p:spPr>
           <a:xfrm>
-            <a:off x="943026" y="1820762"/>
-            <a:ext cx="10640594" cy="2678085"/>
+            <a:off x="965289" y="2128323"/>
+            <a:ext cx="10640594" cy="2203014"/>
           </a:xfrm>
         </p:spPr>
         <p:txBody>
@@ -6304,83 +6162,8 @@
                 <a:spcPct val="100000"/>
               </a:lnSpc>
             </a:pPr>
-            <a:r>
-              <a:rPr lang="en-IE" sz="2400" dirty="0">
-                <a:effectLst/>
-                <a:latin typeface="Times New Roman" panose="02020603050405020304" pitchFamily="18" charset="0"/>
-                <a:ea typeface="Calibri" panose="020F0502020204030204" pitchFamily="34" charset="0"/>
-                <a:cs typeface="Times New Roman" panose="02020603050405020304" pitchFamily="18" charset="0"/>
-              </a:rPr>
-              <a:t>Template </a:t>
-            </a:r>
-            <a:r>
-              <a:rPr lang="en-IE" sz="2400" baseline="30000" dirty="0">
-                <a:effectLst/>
-                <a:latin typeface="Times New Roman" panose="02020603050405020304" pitchFamily="18" charset="0"/>
-                <a:ea typeface="Calibri" panose="020F0502020204030204" pitchFamily="34" charset="0"/>
-                <a:cs typeface="Times New Roman" panose="02020603050405020304" pitchFamily="18" charset="0"/>
-              </a:rPr>
-              <a:t>1</a:t>
-            </a:r>
-            <a:r>
-              <a:rPr lang="en-IE" sz="2400" dirty="0">
-                <a:effectLst/>
-                <a:latin typeface="Times New Roman" panose="02020603050405020304" pitchFamily="18" charset="0"/>
-                <a:ea typeface="Calibri" panose="020F0502020204030204" pitchFamily="34" charset="0"/>
-                <a:cs typeface="Times New Roman" panose="02020603050405020304" pitchFamily="18" charset="0"/>
-              </a:rPr>
-              <a:t>: </a:t>
-            </a:r>
-            <a:r>
-              <a:rPr lang="en-IE" sz="2400" b="0" dirty="0">
-                <a:effectLst/>
-                <a:latin typeface="Times New Roman" panose="02020603050405020304" pitchFamily="18" charset="0"/>
-                <a:ea typeface="Calibri" panose="020F0502020204030204" pitchFamily="34" charset="0"/>
-                <a:cs typeface="Times New Roman" panose="02020603050405020304" pitchFamily="18" charset="0"/>
-              </a:rPr>
-              <a:t>Interval/Ordinal vs Interval/Ordinal: “Is there a correlation between “</a:t>
-            </a:r>
-            <a:r>
-              <a:rPr lang="en-IN" sz="2400" b="0" dirty="0">
-                <a:latin typeface="Times New Roman" panose="02020603050405020304" pitchFamily="18" charset="0"/>
-                <a:cs typeface="Times New Roman" panose="02020603050405020304" pitchFamily="18" charset="0"/>
-              </a:rPr>
-              <a:t>Happiness Score” </a:t>
-            </a:r>
-            <a:r>
-              <a:rPr lang="en-IE" sz="2400" b="0" dirty="0">
-                <a:effectLst/>
-                <a:latin typeface="Times New Roman" panose="02020603050405020304" pitchFamily="18" charset="0"/>
-                <a:ea typeface="Calibri" panose="020F0502020204030204" pitchFamily="34" charset="0"/>
-                <a:cs typeface="Times New Roman" panose="02020603050405020304" pitchFamily="18" charset="0"/>
-              </a:rPr>
-              <a:t>and “</a:t>
-            </a:r>
-            <a:r>
-              <a:rPr lang="en-IN" sz="2400" b="0" dirty="0">
-                <a:latin typeface="Times New Roman" panose="02020603050405020304" pitchFamily="18" charset="0"/>
-                <a:cs typeface="Times New Roman" panose="02020603050405020304" pitchFamily="18" charset="0"/>
-              </a:rPr>
-              <a:t>Economy (GDP per Capita)”</a:t>
-            </a:r>
-            <a:r>
-              <a:rPr lang="en-IE" sz="2400" b="0" dirty="0">
-                <a:latin typeface="Times New Roman" panose="02020603050405020304" pitchFamily="18" charset="0"/>
-                <a:cs typeface="Times New Roman" panose="02020603050405020304" pitchFamily="18" charset="0"/>
-              </a:rPr>
-              <a:t> ?</a:t>
-            </a:r>
             <a:br>
               <a:rPr lang="en-IE" sz="2400" b="0" dirty="0">
-                <a:effectLst/>
-                <a:latin typeface="Times New Roman" panose="02020603050405020304" pitchFamily="18" charset="0"/>
-                <a:ea typeface="Calibri" panose="020F0502020204030204" pitchFamily="34" charset="0"/>
-                <a:cs typeface="Times New Roman" panose="02020603050405020304" pitchFamily="18" charset="0"/>
-              </a:rPr>
-            </a:br>
-            <a:br>
-              <a:rPr lang="en-IE" sz="2400" b="0" dirty="0">
-                <a:effectLst/>
                 <a:latin typeface="Times New Roman" panose="02020603050405020304" pitchFamily="18" charset="0"/>
                 <a:ea typeface="Calibri" panose="020F0502020204030204" pitchFamily="34" charset="0"/>
                 <a:cs typeface="Times New Roman" panose="02020603050405020304" pitchFamily="18" charset="0"/>
@@ -6485,7 +6268,7 @@
         <p:spPr>
           <a:xfrm>
             <a:off x="630947" y="1326791"/>
-            <a:ext cx="10406581" cy="1391600"/>
+            <a:ext cx="10406581" cy="1829364"/>
           </a:xfrm>
         </p:spPr>
         <p:txBody>
@@ -6494,7 +6277,7 @@
           </a:bodyPr>
           <a:lstStyle/>
           <a:p>
-            <a:pPr>
+            <a:pPr algn="ctr">
               <a:lnSpc>
                 <a:spcPct val="100000"/>
               </a:lnSpc>
@@ -6513,6 +6296,16 @@
               </a:rPr>
               <a:t>:</a:t>
             </a:r>
+            <a:br>
+              <a:rPr lang="en-GB" sz="2400" b="0" dirty="0">
+                <a:latin typeface="Times New Roman" panose="02020603050405020304" pitchFamily="18" charset="0"/>
+                <a:cs typeface="Times New Roman" panose="02020603050405020304" pitchFamily="18" charset="0"/>
+              </a:rPr>
+            </a:br>
+            <a:endParaRPr lang="en-GB" sz="2400" b="0" dirty="0">
+              <a:latin typeface="Times New Roman" panose="02020603050405020304" pitchFamily="18" charset="0"/>
+              <a:cs typeface="Times New Roman" panose="02020603050405020304" pitchFamily="18" charset="0"/>
+            </a:endParaRPr>
           </a:p>
           <a:p>
             <a:pPr>
@@ -6654,87 +6447,34 @@
       </p:sp>
       <p:sp>
         <p:nvSpPr>
-          <p:cNvPr id="6" name="TextBox 5">
-            <a:extLst>
-              <a:ext uri="{FF2B5EF4-FFF2-40B4-BE49-F238E27FC236}">
-                <a16:creationId xmlns:a16="http://schemas.microsoft.com/office/drawing/2014/main" id="{1841CE34-1B2E-88D5-0C3F-506E8C37BB7B}"/>
-              </a:ext>
-            </a:extLst>
-          </p:cNvPr>
-          <p:cNvSpPr txBox="1"/>
-          <p:nvPr/>
+          <p:cNvPr id="3" name="Footer Placeholder 2">
+            <a:extLst>
+              <a:ext uri="{FF2B5EF4-FFF2-40B4-BE49-F238E27FC236}">
+                <a16:creationId xmlns:a16="http://schemas.microsoft.com/office/drawing/2014/main" id="{D8A35D28-D276-2BCE-2117-A9D50F1A605E}"/>
+              </a:ext>
+            </a:extLst>
+          </p:cNvPr>
+          <p:cNvSpPr>
+            <a:spLocks noGrp="1"/>
+          </p:cNvSpPr>
+          <p:nvPr>
+            <p:ph type="ftr" sz="quarter" idx="11"/>
+          </p:nvPr>
         </p:nvSpPr>
         <p:spPr>
           <a:xfrm>
-            <a:off x="3539026" y="5096297"/>
-            <a:ext cx="7811780" cy="1477328"/>
+            <a:off x="630947" y="584545"/>
+            <a:ext cx="7176911" cy="230832"/>
           </a:xfrm>
-          <a:prstGeom prst="rect">
-            <a:avLst/>
-          </a:prstGeom>
-          <a:noFill/>
         </p:spPr>
         <p:txBody>
-          <a:bodyPr wrap="square" lIns="91440" tIns="45720" rIns="91440" bIns="45720" anchor="t">
-            <a:spAutoFit/>
-          </a:bodyPr>
+          <a:bodyPr/>
           <a:lstStyle/>
           <a:p>
             <a:r>
               <a:rPr lang="en-GB" dirty="0"/>
-              <a:t>L</a:t>
-            </a:r>
-            <a:r>
-              <a:rPr lang="en-GB" sz="1800" b="0" dirty="0"/>
-              <a:t>eave the hypotheses as </a:t>
-            </a:r>
-            <a:r>
-              <a:rPr lang="en-GB" dirty="0"/>
-              <a:t>two </a:t>
-            </a:r>
-            <a:r>
-              <a:rPr lang="en-GB" sz="1800" b="0" dirty="0"/>
-              <a:t>statements for now – after your </a:t>
-            </a:r>
-            <a:r>
-              <a:rPr lang="en-GB" dirty="0"/>
-              <a:t>statistical </a:t>
-            </a:r>
-            <a:r>
-              <a:rPr lang="en-GB" sz="1800" b="0" dirty="0"/>
-              <a:t>analysis </a:t>
-            </a:r>
-            <a:r>
-              <a:rPr lang="en-GB" dirty="0"/>
-              <a:t>test, </a:t>
-            </a:r>
-            <a:r>
-              <a:rPr lang="en-GB" sz="1800" b="0" dirty="0"/>
-              <a:t>you </a:t>
-            </a:r>
-            <a:r>
-              <a:rPr lang="en-GB" dirty="0"/>
-              <a:t>will </a:t>
-            </a:r>
-            <a:r>
-              <a:rPr lang="en-GB" sz="1800" b="0" dirty="0"/>
-              <a:t>choose one or the other.</a:t>
-            </a:r>
-            <a:r>
-              <a:rPr lang="en-GB" dirty="0"/>
-              <a:t> (</a:t>
-            </a:r>
-            <a:r>
-              <a:rPr lang="en-GB" i="1" dirty="0"/>
-              <a:t>You will report: "We fail to reject the null hypothesis" with no significant result, or if you do have significance [p-value = &lt; 0.05] you can state "We reject the null hypothesis".   More guidance on hypothesis testing is given in the lectures</a:t>
-            </a:r>
-            <a:r>
-              <a:rPr lang="en-GB" dirty="0"/>
-              <a:t>.)</a:t>
-            </a:r>
-            <a:endParaRPr lang="en-GB" dirty="0">
-              <a:cs typeface="Arial"/>
-            </a:endParaRPr>
+              <a:t>PRE 7COM1079-2025  Student Group No: B111</a:t>
+            </a:r>
           </a:p>
         </p:txBody>
       </p:sp>
@@ -6770,34 +6510,6 @@
       </p:grpSpPr>
       <p:sp>
         <p:nvSpPr>
-          <p:cNvPr id="3" name="Footer Placeholder 2">
-            <a:extLst>
-              <a:ext uri="{FF2B5EF4-FFF2-40B4-BE49-F238E27FC236}">
-                <a16:creationId xmlns:a16="http://schemas.microsoft.com/office/drawing/2014/main" id="{3926C7A7-5FCA-FEB3-9788-33A11681562E}"/>
-              </a:ext>
-            </a:extLst>
-          </p:cNvPr>
-          <p:cNvSpPr>
-            <a:spLocks noGrp="1"/>
-          </p:cNvSpPr>
-          <p:nvPr>
-            <p:ph type="ftr" sz="quarter" idx="11"/>
-          </p:nvPr>
-        </p:nvSpPr>
-        <p:spPr/>
-        <p:txBody>
-          <a:bodyPr/>
-          <a:lstStyle/>
-          <a:p>
-            <a:r>
-              <a:rPr lang="en-GB"/>
-              <a:t>PRESENTATION TITLE (ADD VIA INSERT, HEADER &amp; FOOTER)</a:t>
-            </a:r>
-          </a:p>
-        </p:txBody>
-      </p:sp>
-      <p:sp>
-        <p:nvSpPr>
           <p:cNvPr id="4" name="Slide Number Placeholder 3">
             <a:extLst>
               <a:ext uri="{FF2B5EF4-FFF2-40B4-BE49-F238E27FC236}">
@@ -7000,6 +6712,136 @@
               </a:rPr>
             </a:br>
             <a:endParaRPr lang="en-IN" dirty="0"/>
+          </a:p>
+        </p:txBody>
+      </p:sp>
+      <p:sp>
+        <p:nvSpPr>
+          <p:cNvPr id="6" name="Footer Placeholder 2">
+            <a:extLst>
+              <a:ext uri="{FF2B5EF4-FFF2-40B4-BE49-F238E27FC236}">
+                <a16:creationId xmlns:a16="http://schemas.microsoft.com/office/drawing/2014/main" id="{4F8B8FCD-8789-7FA5-EDEF-D919F085E01F}"/>
+              </a:ext>
+            </a:extLst>
+          </p:cNvPr>
+          <p:cNvSpPr txBox="1">
+            <a:spLocks/>
+          </p:cNvSpPr>
+          <p:nvPr/>
+        </p:nvSpPr>
+        <p:spPr>
+          <a:xfrm>
+            <a:off x="741598" y="560190"/>
+            <a:ext cx="7176911" cy="230832"/>
+          </a:xfrm>
+          <a:prstGeom prst="rect">
+            <a:avLst/>
+          </a:prstGeom>
+        </p:spPr>
+        <p:txBody>
+          <a:bodyPr vert="horz" lIns="0" tIns="0" rIns="0" bIns="0" rtlCol="0" anchor="t" anchorCtr="0">
+            <a:noAutofit/>
+          </a:bodyPr>
+          <a:lstStyle>
+            <a:defPPr>
+              <a:defRPr lang="en-US"/>
+            </a:defPPr>
+            <a:lvl1pPr marL="0" algn="l" defTabSz="914400" rtl="0" eaLnBrk="1" latinLnBrk="0" hangingPunct="1">
+              <a:defRPr sz="1500" kern="1200">
+                <a:solidFill>
+                  <a:srgbClr val="8F9898"/>
+                </a:solidFill>
+                <a:latin typeface="+mn-lt"/>
+                <a:ea typeface="+mn-ea"/>
+                <a:cs typeface="+mn-cs"/>
+              </a:defRPr>
+            </a:lvl1pPr>
+            <a:lvl2pPr marL="457200" algn="l" defTabSz="914400" rtl="0" eaLnBrk="1" latinLnBrk="0" hangingPunct="1">
+              <a:defRPr sz="1800" kern="1200">
+                <a:solidFill>
+                  <a:schemeClr val="tx1"/>
+                </a:solidFill>
+                <a:latin typeface="+mn-lt"/>
+                <a:ea typeface="+mn-ea"/>
+                <a:cs typeface="+mn-cs"/>
+              </a:defRPr>
+            </a:lvl2pPr>
+            <a:lvl3pPr marL="914400" algn="l" defTabSz="914400" rtl="0" eaLnBrk="1" latinLnBrk="0" hangingPunct="1">
+              <a:defRPr sz="1800" kern="1200">
+                <a:solidFill>
+                  <a:schemeClr val="tx1"/>
+                </a:solidFill>
+                <a:latin typeface="+mn-lt"/>
+                <a:ea typeface="+mn-ea"/>
+                <a:cs typeface="+mn-cs"/>
+              </a:defRPr>
+            </a:lvl3pPr>
+            <a:lvl4pPr marL="1371600" algn="l" defTabSz="914400" rtl="0" eaLnBrk="1" latinLnBrk="0" hangingPunct="1">
+              <a:defRPr sz="1800" kern="1200">
+                <a:solidFill>
+                  <a:schemeClr val="tx1"/>
+                </a:solidFill>
+                <a:latin typeface="+mn-lt"/>
+                <a:ea typeface="+mn-ea"/>
+                <a:cs typeface="+mn-cs"/>
+              </a:defRPr>
+            </a:lvl4pPr>
+            <a:lvl5pPr marL="1828800" algn="l" defTabSz="914400" rtl="0" eaLnBrk="1" latinLnBrk="0" hangingPunct="1">
+              <a:defRPr sz="1800" kern="1200">
+                <a:solidFill>
+                  <a:schemeClr val="tx1"/>
+                </a:solidFill>
+                <a:latin typeface="+mn-lt"/>
+                <a:ea typeface="+mn-ea"/>
+                <a:cs typeface="+mn-cs"/>
+              </a:defRPr>
+            </a:lvl5pPr>
+            <a:lvl6pPr marL="2286000" algn="l" defTabSz="914400" rtl="0" eaLnBrk="1" latinLnBrk="0" hangingPunct="1">
+              <a:defRPr sz="1800" kern="1200">
+                <a:solidFill>
+                  <a:schemeClr val="tx1"/>
+                </a:solidFill>
+                <a:latin typeface="+mn-lt"/>
+                <a:ea typeface="+mn-ea"/>
+                <a:cs typeface="+mn-cs"/>
+              </a:defRPr>
+            </a:lvl6pPr>
+            <a:lvl7pPr marL="2743200" algn="l" defTabSz="914400" rtl="0" eaLnBrk="1" latinLnBrk="0" hangingPunct="1">
+              <a:defRPr sz="1800" kern="1200">
+                <a:solidFill>
+                  <a:schemeClr val="tx1"/>
+                </a:solidFill>
+                <a:latin typeface="+mn-lt"/>
+                <a:ea typeface="+mn-ea"/>
+                <a:cs typeface="+mn-cs"/>
+              </a:defRPr>
+            </a:lvl7pPr>
+            <a:lvl8pPr marL="3200400" algn="l" defTabSz="914400" rtl="0" eaLnBrk="1" latinLnBrk="0" hangingPunct="1">
+              <a:defRPr sz="1800" kern="1200">
+                <a:solidFill>
+                  <a:schemeClr val="tx1"/>
+                </a:solidFill>
+                <a:latin typeface="+mn-lt"/>
+                <a:ea typeface="+mn-ea"/>
+                <a:cs typeface="+mn-cs"/>
+              </a:defRPr>
+            </a:lvl8pPr>
+            <a:lvl9pPr marL="3657600" algn="l" defTabSz="914400" rtl="0" eaLnBrk="1" latinLnBrk="0" hangingPunct="1">
+              <a:defRPr sz="1800" kern="1200">
+                <a:solidFill>
+                  <a:schemeClr val="tx1"/>
+                </a:solidFill>
+                <a:latin typeface="+mn-lt"/>
+                <a:ea typeface="+mn-ea"/>
+                <a:cs typeface="+mn-cs"/>
+              </a:defRPr>
+            </a:lvl9pPr>
+          </a:lstStyle>
+          <a:p>
+            <a:r>
+              <a:rPr lang="en-GB" dirty="0"/>
+              <a:t>PRE 7COM1079-2025  Student Group No: B111</a:t>
+            </a:r>
           </a:p>
         </p:txBody>
       </p:sp>
@@ -7035,34 +6877,6 @@
       </p:grpSpPr>
       <p:sp>
         <p:nvSpPr>
-          <p:cNvPr id="3" name="Footer Placeholder 2">
-            <a:extLst>
-              <a:ext uri="{FF2B5EF4-FFF2-40B4-BE49-F238E27FC236}">
-                <a16:creationId xmlns:a16="http://schemas.microsoft.com/office/drawing/2014/main" id="{AACB796C-048F-FCAC-A158-FDB6D71FD11B}"/>
-              </a:ext>
-            </a:extLst>
-          </p:cNvPr>
-          <p:cNvSpPr>
-            <a:spLocks noGrp="1"/>
-          </p:cNvSpPr>
-          <p:nvPr>
-            <p:ph type="ftr" sz="quarter" idx="11"/>
-          </p:nvPr>
-        </p:nvSpPr>
-        <p:spPr/>
-        <p:txBody>
-          <a:bodyPr/>
-          <a:lstStyle/>
-          <a:p>
-            <a:r>
-              <a:rPr lang="en-GB"/>
-              <a:t>PRESENTATION TITLE (ADD VIA INSERT, HEADER &amp; FOOTER)</a:t>
-            </a:r>
-          </a:p>
-        </p:txBody>
-      </p:sp>
-      <p:sp>
-        <p:nvSpPr>
           <p:cNvPr id="4" name="Slide Number Placeholder 3">
             <a:extLst>
               <a:ext uri="{FF2B5EF4-FFF2-40B4-BE49-F238E27FC236}">
@@ -7180,6 +6994,136 @@
                 </a:outerShdw>
               </a:effectLst>
             </a:endParaRPr>
+          </a:p>
+        </p:txBody>
+      </p:sp>
+      <p:sp>
+        <p:nvSpPr>
+          <p:cNvPr id="2" name="Footer Placeholder 2">
+            <a:extLst>
+              <a:ext uri="{FF2B5EF4-FFF2-40B4-BE49-F238E27FC236}">
+                <a16:creationId xmlns:a16="http://schemas.microsoft.com/office/drawing/2014/main" id="{5F04BB56-DE69-EEBD-005C-DFADD5B689A7}"/>
+              </a:ext>
+            </a:extLst>
+          </p:cNvPr>
+          <p:cNvSpPr txBox="1">
+            <a:spLocks/>
+          </p:cNvSpPr>
+          <p:nvPr/>
+        </p:nvSpPr>
+        <p:spPr>
+          <a:xfrm>
+            <a:off x="606411" y="560190"/>
+            <a:ext cx="7176911" cy="230832"/>
+          </a:xfrm>
+          <a:prstGeom prst="rect">
+            <a:avLst/>
+          </a:prstGeom>
+        </p:spPr>
+        <p:txBody>
+          <a:bodyPr vert="horz" lIns="0" tIns="0" rIns="0" bIns="0" rtlCol="0" anchor="t" anchorCtr="0">
+            <a:noAutofit/>
+          </a:bodyPr>
+          <a:lstStyle>
+            <a:defPPr>
+              <a:defRPr lang="en-US"/>
+            </a:defPPr>
+            <a:lvl1pPr marL="0" algn="l" defTabSz="914400" rtl="0" eaLnBrk="1" latinLnBrk="0" hangingPunct="1">
+              <a:defRPr sz="1500" kern="1200">
+                <a:solidFill>
+                  <a:srgbClr val="8F9898"/>
+                </a:solidFill>
+                <a:latin typeface="+mn-lt"/>
+                <a:ea typeface="+mn-ea"/>
+                <a:cs typeface="+mn-cs"/>
+              </a:defRPr>
+            </a:lvl1pPr>
+            <a:lvl2pPr marL="457200" algn="l" defTabSz="914400" rtl="0" eaLnBrk="1" latinLnBrk="0" hangingPunct="1">
+              <a:defRPr sz="1800" kern="1200">
+                <a:solidFill>
+                  <a:schemeClr val="tx1"/>
+                </a:solidFill>
+                <a:latin typeface="+mn-lt"/>
+                <a:ea typeface="+mn-ea"/>
+                <a:cs typeface="+mn-cs"/>
+              </a:defRPr>
+            </a:lvl2pPr>
+            <a:lvl3pPr marL="914400" algn="l" defTabSz="914400" rtl="0" eaLnBrk="1" latinLnBrk="0" hangingPunct="1">
+              <a:defRPr sz="1800" kern="1200">
+                <a:solidFill>
+                  <a:schemeClr val="tx1"/>
+                </a:solidFill>
+                <a:latin typeface="+mn-lt"/>
+                <a:ea typeface="+mn-ea"/>
+                <a:cs typeface="+mn-cs"/>
+              </a:defRPr>
+            </a:lvl3pPr>
+            <a:lvl4pPr marL="1371600" algn="l" defTabSz="914400" rtl="0" eaLnBrk="1" latinLnBrk="0" hangingPunct="1">
+              <a:defRPr sz="1800" kern="1200">
+                <a:solidFill>
+                  <a:schemeClr val="tx1"/>
+                </a:solidFill>
+                <a:latin typeface="+mn-lt"/>
+                <a:ea typeface="+mn-ea"/>
+                <a:cs typeface="+mn-cs"/>
+              </a:defRPr>
+            </a:lvl4pPr>
+            <a:lvl5pPr marL="1828800" algn="l" defTabSz="914400" rtl="0" eaLnBrk="1" latinLnBrk="0" hangingPunct="1">
+              <a:defRPr sz="1800" kern="1200">
+                <a:solidFill>
+                  <a:schemeClr val="tx1"/>
+                </a:solidFill>
+                <a:latin typeface="+mn-lt"/>
+                <a:ea typeface="+mn-ea"/>
+                <a:cs typeface="+mn-cs"/>
+              </a:defRPr>
+            </a:lvl5pPr>
+            <a:lvl6pPr marL="2286000" algn="l" defTabSz="914400" rtl="0" eaLnBrk="1" latinLnBrk="0" hangingPunct="1">
+              <a:defRPr sz="1800" kern="1200">
+                <a:solidFill>
+                  <a:schemeClr val="tx1"/>
+                </a:solidFill>
+                <a:latin typeface="+mn-lt"/>
+                <a:ea typeface="+mn-ea"/>
+                <a:cs typeface="+mn-cs"/>
+              </a:defRPr>
+            </a:lvl6pPr>
+            <a:lvl7pPr marL="2743200" algn="l" defTabSz="914400" rtl="0" eaLnBrk="1" latinLnBrk="0" hangingPunct="1">
+              <a:defRPr sz="1800" kern="1200">
+                <a:solidFill>
+                  <a:schemeClr val="tx1"/>
+                </a:solidFill>
+                <a:latin typeface="+mn-lt"/>
+                <a:ea typeface="+mn-ea"/>
+                <a:cs typeface="+mn-cs"/>
+              </a:defRPr>
+            </a:lvl7pPr>
+            <a:lvl8pPr marL="3200400" algn="l" defTabSz="914400" rtl="0" eaLnBrk="1" latinLnBrk="0" hangingPunct="1">
+              <a:defRPr sz="1800" kern="1200">
+                <a:solidFill>
+                  <a:schemeClr val="tx1"/>
+                </a:solidFill>
+                <a:latin typeface="+mn-lt"/>
+                <a:ea typeface="+mn-ea"/>
+                <a:cs typeface="+mn-cs"/>
+              </a:defRPr>
+            </a:lvl8pPr>
+            <a:lvl9pPr marL="3657600" algn="l" defTabSz="914400" rtl="0" eaLnBrk="1" latinLnBrk="0" hangingPunct="1">
+              <a:defRPr sz="1800" kern="1200">
+                <a:solidFill>
+                  <a:schemeClr val="tx1"/>
+                </a:solidFill>
+                <a:latin typeface="+mn-lt"/>
+                <a:ea typeface="+mn-ea"/>
+                <a:cs typeface="+mn-cs"/>
+              </a:defRPr>
+            </a:lvl9pPr>
+          </a:lstStyle>
+          <a:p>
+            <a:r>
+              <a:rPr lang="en-GB" dirty="0"/>
+              <a:t>PRE 7COM1079-2025  Student Group No: B111</a:t>
+            </a:r>
           </a:p>
         </p:txBody>
       </p:sp>

</xml_diff>